<commit_message>
updating my pres copy with FRED data overview
</commit_message>
<xml_diff>
--- a/Project 1 Presentation Template.pptx
+++ b/Project 1 Presentation Template.pptx
@@ -5,17 +5,18 @@
     <p:sldMasterId id="2147483689" r:id="rId1"/>
   </p:sldMasterIdLst>
   <p:notesMasterIdLst>
-    <p:notesMasterId r:id="rId10"/>
+    <p:notesMasterId r:id="rId11"/>
   </p:notesMasterIdLst>
   <p:sldIdLst>
     <p:sldId id="256" r:id="rId2"/>
     <p:sldId id="257" r:id="rId3"/>
     <p:sldId id="258" r:id="rId4"/>
     <p:sldId id="259" r:id="rId5"/>
-    <p:sldId id="260" r:id="rId6"/>
-    <p:sldId id="261" r:id="rId7"/>
-    <p:sldId id="262" r:id="rId8"/>
-    <p:sldId id="263" r:id="rId9"/>
+    <p:sldId id="264" r:id="rId6"/>
+    <p:sldId id="260" r:id="rId7"/>
+    <p:sldId id="261" r:id="rId8"/>
+    <p:sldId id="262" r:id="rId9"/>
+    <p:sldId id="263" r:id="rId10"/>
   </p:sldIdLst>
   <p:sldSz cx="12192000" cy="6858000"/>
   <p:notesSz cx="6858000" cy="9144000"/>
@@ -204,7 +205,7 @@
           <a:p>
             <a:fld id="{F6F9B6C9-9DF1-4394-BC16-4F555A4B3822}" type="datetimeFigureOut">
               <a:rPr lang="en-US" smtClean="0"/>
-              <a:t>8/11/2018</a:t>
+              <a:t>8/18/2018</a:t>
             </a:fld>
             <a:endParaRPr lang="en-US"/>
           </a:p>
@@ -555,6 +556,90 @@
 </p:notes>
 </file>
 
+<file path=ppt/notesSlides/notesSlide2.xml><?xml version="1.0" encoding="utf-8"?>
+<p:notes xmlns:a="http://schemas.openxmlformats.org/drawingml/2006/main" xmlns:r="http://schemas.openxmlformats.org/officeDocument/2006/relationships" xmlns:p="http://schemas.openxmlformats.org/presentationml/2006/main">
+  <p:cSld>
+    <p:spTree>
+      <p:nvGrpSpPr>
+        <p:cNvPr id="1" name=""/>
+        <p:cNvGrpSpPr/>
+        <p:nvPr/>
+      </p:nvGrpSpPr>
+      <p:grpSpPr>
+        <a:xfrm>
+          <a:off x="0" y="0"/>
+          <a:ext cx="0" cy="0"/>
+          <a:chOff x="0" y="0"/>
+          <a:chExt cx="0" cy="0"/>
+        </a:xfrm>
+      </p:grpSpPr>
+      <p:sp>
+        <p:nvSpPr>
+          <p:cNvPr id="2" name="Slide Image Placeholder 1"/>
+          <p:cNvSpPr>
+            <a:spLocks noGrp="1" noRot="1" noChangeAspect="1"/>
+          </p:cNvSpPr>
+          <p:nvPr>
+            <p:ph type="sldImg"/>
+          </p:nvPr>
+        </p:nvSpPr>
+        <p:spPr/>
+      </p:sp>
+      <p:sp>
+        <p:nvSpPr>
+          <p:cNvPr id="3" name="Notes Placeholder 2"/>
+          <p:cNvSpPr>
+            <a:spLocks noGrp="1"/>
+          </p:cNvSpPr>
+          <p:nvPr>
+            <p:ph type="body" idx="1"/>
+          </p:nvPr>
+        </p:nvSpPr>
+        <p:spPr/>
+        <p:txBody>
+          <a:bodyPr/>
+          <a:lstStyle/>
+          <a:p>
+            <a:endParaRPr lang="en-US" dirty="0"/>
+          </a:p>
+        </p:txBody>
+      </p:sp>
+      <p:sp>
+        <p:nvSpPr>
+          <p:cNvPr id="4" name="Slide Number Placeholder 3"/>
+          <p:cNvSpPr>
+            <a:spLocks noGrp="1"/>
+          </p:cNvSpPr>
+          <p:nvPr>
+            <p:ph type="sldNum" sz="quarter" idx="10"/>
+          </p:nvPr>
+        </p:nvSpPr>
+        <p:spPr/>
+        <p:txBody>
+          <a:bodyPr/>
+          <a:lstStyle/>
+          <a:p>
+            <a:fld id="{D559B289-E7DD-4037-A7F5-74A65164D4FB}" type="slidenum">
+              <a:rPr lang="en-US" smtClean="0"/>
+              <a:t>5</a:t>
+            </a:fld>
+            <a:endParaRPr lang="en-US"/>
+          </a:p>
+        </p:txBody>
+      </p:sp>
+    </p:spTree>
+    <p:extLst>
+      <p:ext uri="{BB962C8B-B14F-4D97-AF65-F5344CB8AC3E}">
+        <p14:creationId xmlns:p14="http://schemas.microsoft.com/office/powerpoint/2010/main" val="1185367351"/>
+      </p:ext>
+    </p:extLst>
+  </p:cSld>
+  <p:clrMapOvr>
+    <a:masterClrMapping/>
+  </p:clrMapOvr>
+</p:notes>
+</file>
+
 <file path=ppt/slideLayouts/slideLayout1.xml><?xml version="1.0" encoding="utf-8"?>
 <p:sldLayout xmlns:a="http://schemas.openxmlformats.org/drawingml/2006/main" xmlns:r="http://schemas.openxmlformats.org/officeDocument/2006/relationships" xmlns:p="http://schemas.openxmlformats.org/presentationml/2006/main" showMasterSp="0" type="title" preserve="1">
   <p:cSld name="Title Slide">
@@ -781,7 +866,7 @@
           <a:p>
             <a:fld id="{1E1E479D-5F8C-4919-ACB4-332E378273DA}" type="datetimeFigureOut">
               <a:rPr lang="en-US" smtClean="0"/>
-              <a:t>8/11/2018</a:t>
+              <a:t>8/18/2018</a:t>
             </a:fld>
             <a:endParaRPr lang="en-US"/>
           </a:p>
@@ -989,7 +1074,7 @@
           <a:p>
             <a:fld id="{1E1E479D-5F8C-4919-ACB4-332E378273DA}" type="datetimeFigureOut">
               <a:rPr lang="en-US" smtClean="0"/>
-              <a:t>8/11/2018</a:t>
+              <a:t>8/18/2018</a:t>
             </a:fld>
             <a:endParaRPr lang="en-US"/>
           </a:p>
@@ -1245,7 +1330,7 @@
           <a:p>
             <a:fld id="{1E1E479D-5F8C-4919-ACB4-332E378273DA}" type="datetimeFigureOut">
               <a:rPr lang="en-US" smtClean="0"/>
-              <a:t>8/11/2018</a:t>
+              <a:t>8/18/2018</a:t>
             </a:fld>
             <a:endParaRPr lang="en-US"/>
           </a:p>
@@ -1419,7 +1504,7 @@
           <a:p>
             <a:fld id="{1E1E479D-5F8C-4919-ACB4-332E378273DA}" type="datetimeFigureOut">
               <a:rPr lang="en-US" smtClean="0"/>
-              <a:t>8/11/2018</a:t>
+              <a:t>8/18/2018</a:t>
             </a:fld>
             <a:endParaRPr lang="en-US"/>
           </a:p>
@@ -1762,7 +1847,7 @@
           <a:p>
             <a:fld id="{1E1E479D-5F8C-4919-ACB4-332E378273DA}" type="datetimeFigureOut">
               <a:rPr lang="en-US" smtClean="0"/>
-              <a:t>8/11/2018</a:t>
+              <a:t>8/18/2018</a:t>
             </a:fld>
             <a:endParaRPr lang="en-US"/>
           </a:p>
@@ -2037,7 +2122,7 @@
           <a:p>
             <a:fld id="{1E1E479D-5F8C-4919-ACB4-332E378273DA}" type="datetimeFigureOut">
               <a:rPr lang="en-US" smtClean="0"/>
-              <a:t>8/11/2018</a:t>
+              <a:t>8/18/2018</a:t>
             </a:fld>
             <a:endParaRPr lang="en-US"/>
           </a:p>
@@ -2416,7 +2501,7 @@
           <a:p>
             <a:fld id="{1E1E479D-5F8C-4919-ACB4-332E378273DA}" type="datetimeFigureOut">
               <a:rPr lang="en-US" smtClean="0"/>
-              <a:t>8/11/2018</a:t>
+              <a:t>8/18/2018</a:t>
             </a:fld>
             <a:endParaRPr lang="en-US"/>
           </a:p>
@@ -2534,7 +2619,7 @@
           <a:p>
             <a:fld id="{1E1E479D-5F8C-4919-ACB4-332E378273DA}" type="datetimeFigureOut">
               <a:rPr lang="en-US" smtClean="0"/>
-              <a:t>8/11/2018</a:t>
+              <a:t>8/18/2018</a:t>
             </a:fld>
             <a:endParaRPr lang="en-US"/>
           </a:p>
@@ -2705,7 +2790,7 @@
           <a:p>
             <a:fld id="{1E1E479D-5F8C-4919-ACB4-332E378273DA}" type="datetimeFigureOut">
               <a:rPr lang="en-US" smtClean="0"/>
-              <a:t>8/11/2018</a:t>
+              <a:t>8/18/2018</a:t>
             </a:fld>
             <a:endParaRPr lang="en-US"/>
           </a:p>
@@ -3059,7 +3144,7 @@
           <a:p>
             <a:fld id="{1E1E479D-5F8C-4919-ACB4-332E378273DA}" type="datetimeFigureOut">
               <a:rPr lang="en-US" smtClean="0"/>
-              <a:t>8/11/2018</a:t>
+              <a:t>8/18/2018</a:t>
             </a:fld>
             <a:endParaRPr lang="en-US"/>
           </a:p>
@@ -3441,7 +3526,7 @@
           <a:p>
             <a:fld id="{1E1E479D-5F8C-4919-ACB4-332E378273DA}" type="datetimeFigureOut">
               <a:rPr lang="en-US" smtClean="0"/>
-              <a:t>8/11/2018</a:t>
+              <a:t>8/18/2018</a:t>
             </a:fld>
             <a:endParaRPr lang="en-US"/>
           </a:p>
@@ -3728,7 +3813,7 @@
           <a:p>
             <a:fld id="{1E1E479D-5F8C-4919-ACB4-332E378273DA}" type="datetimeFigureOut">
               <a:rPr lang="en-US" smtClean="0"/>
-              <a:t>8/11/2018</a:t>
+              <a:t>8/18/2018</a:t>
             </a:fld>
             <a:endParaRPr lang="en-US"/>
           </a:p>
@@ -4880,12 +4965,14 @@
         </p:nvSpPr>
         <p:spPr/>
         <p:txBody>
-          <a:bodyPr/>
-          <a:lstStyle/>
-          <a:p>
-            <a:r>
-              <a:rPr lang="en-US" dirty="0"/>
-              <a:t>Data Analysis</a:t>
+          <a:bodyPr>
+            <a:normAutofit/>
+          </a:bodyPr>
+          <a:lstStyle/>
+          <a:p>
+            <a:r>
+              <a:rPr lang="en-US" dirty="0"/>
+              <a:t>Data Cleanup &amp; Exploration - FRED</a:t>
             </a:r>
           </a:p>
         </p:txBody>
@@ -4906,44 +4993,131 @@
             <p:ph idx="1"/>
           </p:nvPr>
         </p:nvSpPr>
-        <p:spPr/>
-        <p:txBody>
-          <a:bodyPr/>
-          <a:lstStyle/>
-          <a:p>
-            <a:r>
-              <a:rPr lang="en-US" dirty="0"/>
-              <a:t>* Discuss the steps you took to analyze the data and answer each question you asked in your proposal</a:t>
-            </a:r>
-            <a:br>
-              <a:rPr lang="en-US" dirty="0"/>
-            </a:br>
-            <a:r>
-              <a:rPr lang="en-US" dirty="0"/>
-              <a:t>* Present and discuss interesting figures developed during analysis, ideally with the help of </a:t>
-            </a:r>
-            <a:r>
-              <a:rPr lang="en-US" dirty="0" err="1"/>
-              <a:t>Jupyter</a:t>
-            </a:r>
-            <a:r>
-              <a:rPr lang="en-US" dirty="0"/>
-              <a:t> Notebook</a:t>
-            </a:r>
-          </a:p>
-          <a:p>
-            <a:endParaRPr lang="en-US" dirty="0"/>
-          </a:p>
-          <a:p>
-            <a:r>
-              <a:rPr lang="en-US" dirty="0"/>
-              <a:t>CHARTS GO HERE </a:t>
-            </a:r>
-            <a:r>
-              <a:rPr lang="en-US" dirty="0">
-                <a:sym typeface="Wingdings" panose="05000000000000000000" pitchFamily="2" charset="2"/>
-              </a:rPr>
-              <a:t></a:t>
+        <p:spPr>
+          <a:xfrm>
+            <a:off x="1097280" y="1845734"/>
+            <a:ext cx="4521642" cy="4023360"/>
+          </a:xfrm>
+        </p:spPr>
+        <p:txBody>
+          <a:bodyPr>
+            <a:normAutofit fontScale="70000" lnSpcReduction="20000"/>
+          </a:bodyPr>
+          <a:lstStyle/>
+          <a:p>
+            <a:pPr marL="0" indent="0">
+              <a:buNone/>
+            </a:pPr>
+            <a:r>
+              <a:rPr lang="en-US" b="1" dirty="0"/>
+              <a:t>FRED Exploration</a:t>
+            </a:r>
+          </a:p>
+          <a:p>
+            <a:pPr>
+              <a:buFont typeface="Arial" panose="020B0604020202020204" pitchFamily="34" charset="0"/>
+              <a:buChar char="•"/>
+            </a:pPr>
+            <a:r>
+              <a:rPr lang="en-US" dirty="0"/>
+              <a:t> Economic data</a:t>
+            </a:r>
+          </a:p>
+          <a:p>
+            <a:pPr>
+              <a:buFont typeface="Arial" panose="020B0604020202020204" pitchFamily="34" charset="0"/>
+              <a:buChar char="•"/>
+            </a:pPr>
+            <a:r>
+              <a:rPr lang="en-US" dirty="0"/>
+              <a:t> &gt;500k data series</a:t>
+            </a:r>
+          </a:p>
+          <a:p>
+            <a:pPr marL="0" indent="0">
+              <a:buNone/>
+            </a:pPr>
+            <a:r>
+              <a:rPr lang="en-CA" b="1" dirty="0"/>
+              <a:t>FRED Data Files Obtained</a:t>
+            </a:r>
+          </a:p>
+          <a:p>
+            <a:pPr>
+              <a:buFont typeface="Arial" panose="020B0604020202020204" pitchFamily="34" charset="0"/>
+              <a:buChar char="•"/>
+            </a:pPr>
+            <a:r>
+              <a:rPr lang="en-CA" dirty="0"/>
+              <a:t> Monthly unemployment (2000-2018)</a:t>
+            </a:r>
+          </a:p>
+          <a:p>
+            <a:pPr>
+              <a:buFont typeface="Arial" panose="020B0604020202020204" pitchFamily="34" charset="0"/>
+              <a:buChar char="•"/>
+            </a:pPr>
+            <a:r>
+              <a:rPr lang="en-CA" dirty="0"/>
+              <a:t> Monthly labor force participation (2000-2018)</a:t>
+            </a:r>
+          </a:p>
+          <a:p>
+            <a:pPr>
+              <a:buFont typeface="Arial" panose="020B0604020202020204" pitchFamily="34" charset="0"/>
+              <a:buChar char="•"/>
+            </a:pPr>
+            <a:r>
+              <a:rPr lang="en-CA" dirty="0"/>
+              <a:t> Weekly unemployment claims (2000-2018)</a:t>
+            </a:r>
+          </a:p>
+          <a:p>
+            <a:pPr marL="0" indent="0">
+              <a:buNone/>
+            </a:pPr>
+            <a:r>
+              <a:rPr lang="en-CA" b="1" dirty="0"/>
+              <a:t>Cleanup</a:t>
+            </a:r>
+          </a:p>
+          <a:p>
+            <a:pPr>
+              <a:buFont typeface="Arial" panose="020B0604020202020204" pitchFamily="34" charset="0"/>
+              <a:buChar char="•"/>
+            </a:pPr>
+            <a:r>
+              <a:rPr lang="en-CA" dirty="0"/>
+              <a:t>  Removed extraneous columns</a:t>
+            </a:r>
+          </a:p>
+          <a:p>
+            <a:pPr>
+              <a:buFont typeface="Arial" panose="020B0604020202020204" pitchFamily="34" charset="0"/>
+              <a:buChar char="•"/>
+            </a:pPr>
+            <a:r>
+              <a:rPr lang="en-CA" dirty="0"/>
+              <a:t>  Averaged data annually to match NCES data</a:t>
+            </a:r>
+          </a:p>
+          <a:p>
+            <a:pPr marL="0" indent="0">
+              <a:buNone/>
+            </a:pPr>
+            <a:r>
+              <a:rPr lang="en-CA" b="1" dirty="0"/>
+              <a:t>Problems</a:t>
+            </a:r>
+          </a:p>
+          <a:p>
+            <a:pPr>
+              <a:buFont typeface="Arial" panose="020B0604020202020204" pitchFamily="34" charset="0"/>
+              <a:buChar char="•"/>
+            </a:pPr>
+            <a:r>
+              <a:rPr lang="en-US" dirty="0"/>
+              <a:t> Different frequency of observations than NCES data</a:t>
             </a:r>
             <a:br>
               <a:rPr lang="en-US" dirty="0"/>
@@ -4955,10 +5129,113 @@
           </a:p>
         </p:txBody>
       </p:sp>
+      <p:grpSp>
+        <p:nvGrpSpPr>
+          <p:cNvPr id="8" name="Group 7">
+            <a:extLst>
+              <a:ext uri="{FF2B5EF4-FFF2-40B4-BE49-F238E27FC236}">
+                <a16:creationId xmlns:a16="http://schemas.microsoft.com/office/drawing/2014/main" id="{E902432B-616D-4CD6-B96C-83FFFF217B28}"/>
+              </a:ext>
+            </a:extLst>
+          </p:cNvPr>
+          <p:cNvGrpSpPr/>
+          <p:nvPr/>
+        </p:nvGrpSpPr>
+        <p:grpSpPr>
+          <a:xfrm>
+            <a:off x="4887402" y="1896178"/>
+            <a:ext cx="7165929" cy="3224463"/>
+            <a:chOff x="4887402" y="1896178"/>
+            <a:chExt cx="7165929" cy="3224463"/>
+          </a:xfrm>
+        </p:grpSpPr>
+        <p:pic>
+          <p:nvPicPr>
+            <p:cNvPr id="6" name="Picture 5">
+              <a:extLst>
+                <a:ext uri="{FF2B5EF4-FFF2-40B4-BE49-F238E27FC236}">
+                  <a16:creationId xmlns:a16="http://schemas.microsoft.com/office/drawing/2014/main" id="{07C5A5F7-5BDA-48BF-AF6E-7F3B84B0F391}"/>
+                </a:ext>
+              </a:extLst>
+            </p:cNvPr>
+            <p:cNvPicPr>
+              <a:picLocks noChangeAspect="1"/>
+            </p:cNvPicPr>
+            <p:nvPr/>
+          </p:nvPicPr>
+          <p:blipFill>
+            <a:blip r:embed="rId3"/>
+            <a:stretch>
+              <a:fillRect/>
+            </a:stretch>
+          </p:blipFill>
+          <p:spPr>
+            <a:xfrm>
+              <a:off x="4887402" y="1896178"/>
+              <a:ext cx="7165929" cy="3224463"/>
+            </a:xfrm>
+            <a:prstGeom prst="rect">
+              <a:avLst/>
+            </a:prstGeom>
+          </p:spPr>
+        </p:pic>
+        <p:sp>
+          <p:nvSpPr>
+            <p:cNvPr id="7" name="Rectangle: Rounded Corners 6">
+              <a:extLst>
+                <a:ext uri="{FF2B5EF4-FFF2-40B4-BE49-F238E27FC236}">
+                  <a16:creationId xmlns:a16="http://schemas.microsoft.com/office/drawing/2014/main" id="{C4E1CF56-E7F1-403F-8E85-28B001037279}"/>
+                </a:ext>
+              </a:extLst>
+            </p:cNvPr>
+            <p:cNvSpPr/>
+            <p:nvPr/>
+          </p:nvSpPr>
+          <p:spPr>
+            <a:xfrm>
+              <a:off x="11360313" y="1934678"/>
+              <a:ext cx="673768" cy="308009"/>
+            </a:xfrm>
+            <a:prstGeom prst="roundRect">
+              <a:avLst/>
+            </a:prstGeom>
+            <a:noFill/>
+            <a:ln w="38100">
+              <a:solidFill>
+                <a:srgbClr val="00B050"/>
+              </a:solidFill>
+            </a:ln>
+          </p:spPr>
+          <p:style>
+            <a:lnRef idx="2">
+              <a:schemeClr val="accent1">
+                <a:shade val="50000"/>
+              </a:schemeClr>
+            </a:lnRef>
+            <a:fillRef idx="1">
+              <a:schemeClr val="accent1"/>
+            </a:fillRef>
+            <a:effectRef idx="0">
+              <a:schemeClr val="accent1"/>
+            </a:effectRef>
+            <a:fontRef idx="minor">
+              <a:schemeClr val="lt1"/>
+            </a:fontRef>
+          </p:style>
+          <p:txBody>
+            <a:bodyPr rtlCol="0" anchor="ctr"/>
+            <a:lstStyle/>
+            <a:p>
+              <a:pPr algn="ctr"/>
+              <a:endParaRPr lang="en-US" dirty="0"/>
+            </a:p>
+          </p:txBody>
+        </p:sp>
+      </p:grpSp>
     </p:spTree>
     <p:extLst>
       <p:ext uri="{BB962C8B-B14F-4D97-AF65-F5344CB8AC3E}">
-        <p14:creationId xmlns:p14="http://schemas.microsoft.com/office/powerpoint/2010/main" val="3522726075"/>
+        <p14:creationId xmlns:p14="http://schemas.microsoft.com/office/powerpoint/2010/main" val="4036851302"/>
       </p:ext>
     </p:extLst>
   </p:cSld>
@@ -5008,7 +5285,7 @@
           <a:p>
             <a:r>
               <a:rPr lang="en-US" dirty="0"/>
-              <a:t>Discussion</a:t>
+              <a:t>Data Analysis</a:t>
             </a:r>
           </a:p>
         </p:txBody>
@@ -5036,7 +5313,37 @@
           <a:p>
             <a:r>
               <a:rPr lang="en-US" dirty="0"/>
-              <a:t>  * Discuss your findings. Did you find what you expected to find? If not, why not? What inferences or general conclusions can you draw from your analysis?</a:t>
+              <a:t>* Discuss the steps you took to analyze the data and answer each question you asked in your proposal</a:t>
+            </a:r>
+            <a:br>
+              <a:rPr lang="en-US" dirty="0"/>
+            </a:br>
+            <a:r>
+              <a:rPr lang="en-US" dirty="0"/>
+              <a:t>* Present and discuss interesting figures developed during analysis, ideally with the help of </a:t>
+            </a:r>
+            <a:r>
+              <a:rPr lang="en-US" dirty="0" err="1"/>
+              <a:t>Jupyter</a:t>
+            </a:r>
+            <a:r>
+              <a:rPr lang="en-US" dirty="0"/>
+              <a:t> Notebook</a:t>
+            </a:r>
+          </a:p>
+          <a:p>
+            <a:endParaRPr lang="en-US" dirty="0"/>
+          </a:p>
+          <a:p>
+            <a:r>
+              <a:rPr lang="en-US" dirty="0"/>
+              <a:t>CHARTS GO HERE </a:t>
+            </a:r>
+            <a:r>
+              <a:rPr lang="en-US" dirty="0">
+                <a:sym typeface="Wingdings" panose="05000000000000000000" pitchFamily="2" charset="2"/>
+              </a:rPr>
+              <a:t></a:t>
             </a:r>
             <a:br>
               <a:rPr lang="en-US" dirty="0"/>
@@ -5051,7 +5358,7 @@
     </p:spTree>
     <p:extLst>
       <p:ext uri="{BB962C8B-B14F-4D97-AF65-F5344CB8AC3E}">
-        <p14:creationId xmlns:p14="http://schemas.microsoft.com/office/powerpoint/2010/main" val="1047368940"/>
+        <p14:creationId xmlns:p14="http://schemas.microsoft.com/office/powerpoint/2010/main" val="3522726075"/>
       </p:ext>
     </p:extLst>
   </p:cSld>
@@ -5101,6 +5408,99 @@
           <a:p>
             <a:r>
               <a:rPr lang="en-US" dirty="0"/>
+              <a:t>Discussion</a:t>
+            </a:r>
+          </a:p>
+        </p:txBody>
+      </p:sp>
+      <p:sp>
+        <p:nvSpPr>
+          <p:cNvPr id="3" name="Content Placeholder 2">
+            <a:extLst>
+              <a:ext uri="{FF2B5EF4-FFF2-40B4-BE49-F238E27FC236}">
+                <a16:creationId xmlns:a16="http://schemas.microsoft.com/office/drawing/2014/main" id="{30C4F1C1-804B-4A2E-836E-DCB09E48F49D}"/>
+              </a:ext>
+            </a:extLst>
+          </p:cNvPr>
+          <p:cNvSpPr>
+            <a:spLocks noGrp="1"/>
+          </p:cNvSpPr>
+          <p:nvPr>
+            <p:ph idx="1"/>
+          </p:nvPr>
+        </p:nvSpPr>
+        <p:spPr/>
+        <p:txBody>
+          <a:bodyPr/>
+          <a:lstStyle/>
+          <a:p>
+            <a:r>
+              <a:rPr lang="en-US" dirty="0"/>
+              <a:t>  * Discuss your findings. Did you find what you expected to find? If not, why not? What inferences or general conclusions can you draw from your analysis?</a:t>
+            </a:r>
+            <a:br>
+              <a:rPr lang="en-US" dirty="0"/>
+            </a:br>
+            <a:endParaRPr lang="en-US" dirty="0"/>
+          </a:p>
+          <a:p>
+            <a:endParaRPr lang="en-US" dirty="0"/>
+          </a:p>
+        </p:txBody>
+      </p:sp>
+    </p:spTree>
+    <p:extLst>
+      <p:ext uri="{BB962C8B-B14F-4D97-AF65-F5344CB8AC3E}">
+        <p14:creationId xmlns:p14="http://schemas.microsoft.com/office/powerpoint/2010/main" val="1047368940"/>
+      </p:ext>
+    </p:extLst>
+  </p:cSld>
+  <p:clrMapOvr>
+    <a:masterClrMapping/>
+  </p:clrMapOvr>
+</p:sld>
+</file>
+
+<file path=ppt/slides/slide8.xml><?xml version="1.0" encoding="utf-8"?>
+<p:sld xmlns:a="http://schemas.openxmlformats.org/drawingml/2006/main" xmlns:r="http://schemas.openxmlformats.org/officeDocument/2006/relationships" xmlns:p="http://schemas.openxmlformats.org/presentationml/2006/main">
+  <p:cSld>
+    <p:spTree>
+      <p:nvGrpSpPr>
+        <p:cNvPr id="1" name=""/>
+        <p:cNvGrpSpPr/>
+        <p:nvPr/>
+      </p:nvGrpSpPr>
+      <p:grpSpPr>
+        <a:xfrm>
+          <a:off x="0" y="0"/>
+          <a:ext cx="0" cy="0"/>
+          <a:chOff x="0" y="0"/>
+          <a:chExt cx="0" cy="0"/>
+        </a:xfrm>
+      </p:grpSpPr>
+      <p:sp>
+        <p:nvSpPr>
+          <p:cNvPr id="2" name="Title 1">
+            <a:extLst>
+              <a:ext uri="{FF2B5EF4-FFF2-40B4-BE49-F238E27FC236}">
+                <a16:creationId xmlns:a16="http://schemas.microsoft.com/office/drawing/2014/main" id="{0585AFDD-15A8-49BD-A991-AC342AB3A002}"/>
+              </a:ext>
+            </a:extLst>
+          </p:cNvPr>
+          <p:cNvSpPr>
+            <a:spLocks noGrp="1"/>
+          </p:cNvSpPr>
+          <p:nvPr>
+            <p:ph type="title"/>
+          </p:nvPr>
+        </p:nvSpPr>
+        <p:spPr/>
+        <p:txBody>
+          <a:bodyPr/>
+          <a:lstStyle/>
+          <a:p>
+            <a:r>
+              <a:rPr lang="en-US" dirty="0"/>
               <a:t>Post Mortem</a:t>
             </a:r>
           </a:p>
@@ -5164,7 +5564,7 @@
 </p:sld>
 </file>
 
-<file path=ppt/slides/slide8.xml><?xml version="1.0" encoding="utf-8"?>
+<file path=ppt/slides/slide9.xml><?xml version="1.0" encoding="utf-8"?>
 <p:sld xmlns:a="http://schemas.openxmlformats.org/drawingml/2006/main" xmlns:r="http://schemas.openxmlformats.org/officeDocument/2006/relationships" xmlns:p="http://schemas.openxmlformats.org/presentationml/2006/main">
   <p:cSld>
     <p:spTree>

</xml_diff>